<commit_message>
adds link to materials to slides
</commit_message>
<xml_diff>
--- a/day-02/ppt/software_carpentry-python-day_02.pptx
+++ b/day-02/ppt/software_carpentry-python-day_02.pptx
@@ -249,7 +249,7 @@
           <a:p>
             <a:fld id="{412A36AD-C140-47B5-A0AA-2808AF1C1C9D}" type="datetimeFigureOut">
               <a:rPr lang="en-AU" smtClean="0"/>
-              <a:t>10/3/2023</a:t>
+              <a:t>13/3/2023</a:t>
             </a:fld>
             <a:endParaRPr lang="en-AU"/>
           </a:p>
@@ -414,7 +414,7 @@
           <a:p>
             <a:fld id="{2763829E-EB69-4A98-9D54-8D6822520B27}" type="datetimeFigureOut">
               <a:rPr lang="en-AU" smtClean="0"/>
-              <a:t>10/3/2023</a:t>
+              <a:t>13/3/2023</a:t>
             </a:fld>
             <a:endParaRPr lang="en-AU"/>
           </a:p>
@@ -8523,6 +8523,159 @@
           </a:ln>
         </p:spPr>
       </p:pic>
+      <p:sp>
+        <p:nvSpPr>
+          <p:cNvPr id="3" name="Footer Placeholder 4">
+            <a:extLst>
+              <a:ext uri="{FF2B5EF4-FFF2-40B4-BE49-F238E27FC236}">
+                <a16:creationId xmlns:a16="http://schemas.microsoft.com/office/drawing/2014/main" id="{32705A2E-329B-EA0D-8902-2C3E78BBE59D}"/>
+              </a:ext>
+            </a:extLst>
+          </p:cNvPr>
+          <p:cNvSpPr txBox="1">
+            <a:spLocks/>
+          </p:cNvSpPr>
+          <p:nvPr userDrawn="1"/>
+        </p:nvSpPr>
+        <p:spPr>
+          <a:xfrm>
+            <a:off x="2383047" y="6565176"/>
+            <a:ext cx="7425906" cy="217125"/>
+          </a:xfrm>
+          <a:prstGeom prst="rect">
+            <a:avLst/>
+          </a:prstGeom>
+        </p:spPr>
+        <p:txBody>
+          <a:bodyPr vert="horz" lIns="0" tIns="0" rIns="0" bIns="0" rtlCol="0" anchor="ctr"/>
+          <a:lstStyle>
+            <a:defPPr>
+              <a:defRPr lang="en-US"/>
+            </a:defPPr>
+            <a:lvl1pPr marL="0" algn="l" defTabSz="1088279" rtl="0" eaLnBrk="1" latinLnBrk="0" hangingPunct="1">
+              <a:defRPr sz="1100" b="0" i="0" kern="1200">
+                <a:solidFill>
+                  <a:schemeClr val="accent1"/>
+                </a:solidFill>
+                <a:latin typeface="National 2" charset="0"/>
+                <a:ea typeface="National 2" charset="0"/>
+                <a:cs typeface="National 2" charset="0"/>
+              </a:defRPr>
+            </a:lvl1pPr>
+            <a:lvl2pPr marL="544139" algn="l" defTabSz="1088279" rtl="0" eaLnBrk="1" latinLnBrk="0" hangingPunct="1">
+              <a:defRPr sz="2143" kern="1200">
+                <a:solidFill>
+                  <a:schemeClr val="tx1"/>
+                </a:solidFill>
+                <a:latin typeface="+mn-lt"/>
+                <a:ea typeface="+mn-ea"/>
+                <a:cs typeface="+mn-cs"/>
+              </a:defRPr>
+            </a:lvl2pPr>
+            <a:lvl3pPr marL="1088279" algn="l" defTabSz="1088279" rtl="0" eaLnBrk="1" latinLnBrk="0" hangingPunct="1">
+              <a:defRPr sz="2143" kern="1200">
+                <a:solidFill>
+                  <a:schemeClr val="tx1"/>
+                </a:solidFill>
+                <a:latin typeface="+mn-lt"/>
+                <a:ea typeface="+mn-ea"/>
+                <a:cs typeface="+mn-cs"/>
+              </a:defRPr>
+            </a:lvl3pPr>
+            <a:lvl4pPr marL="1632418" algn="l" defTabSz="1088279" rtl="0" eaLnBrk="1" latinLnBrk="0" hangingPunct="1">
+              <a:defRPr sz="2143" kern="1200">
+                <a:solidFill>
+                  <a:schemeClr val="tx1"/>
+                </a:solidFill>
+                <a:latin typeface="+mn-lt"/>
+                <a:ea typeface="+mn-ea"/>
+                <a:cs typeface="+mn-cs"/>
+              </a:defRPr>
+            </a:lvl4pPr>
+            <a:lvl5pPr marL="2176558" algn="l" defTabSz="1088279" rtl="0" eaLnBrk="1" latinLnBrk="0" hangingPunct="1">
+              <a:defRPr sz="2143" kern="1200">
+                <a:solidFill>
+                  <a:schemeClr val="tx1"/>
+                </a:solidFill>
+                <a:latin typeface="+mn-lt"/>
+                <a:ea typeface="+mn-ea"/>
+                <a:cs typeface="+mn-cs"/>
+              </a:defRPr>
+            </a:lvl5pPr>
+            <a:lvl6pPr marL="2720696" algn="l" defTabSz="1088279" rtl="0" eaLnBrk="1" latinLnBrk="0" hangingPunct="1">
+              <a:defRPr sz="2143" kern="1200">
+                <a:solidFill>
+                  <a:schemeClr val="tx1"/>
+                </a:solidFill>
+                <a:latin typeface="+mn-lt"/>
+                <a:ea typeface="+mn-ea"/>
+                <a:cs typeface="+mn-cs"/>
+              </a:defRPr>
+            </a:lvl6pPr>
+            <a:lvl7pPr marL="3264836" algn="l" defTabSz="1088279" rtl="0" eaLnBrk="1" latinLnBrk="0" hangingPunct="1">
+              <a:defRPr sz="2143" kern="1200">
+                <a:solidFill>
+                  <a:schemeClr val="tx1"/>
+                </a:solidFill>
+                <a:latin typeface="+mn-lt"/>
+                <a:ea typeface="+mn-ea"/>
+                <a:cs typeface="+mn-cs"/>
+              </a:defRPr>
+            </a:lvl7pPr>
+            <a:lvl8pPr marL="3808976" algn="l" defTabSz="1088279" rtl="0" eaLnBrk="1" latinLnBrk="0" hangingPunct="1">
+              <a:defRPr sz="2143" kern="1200">
+                <a:solidFill>
+                  <a:schemeClr val="tx1"/>
+                </a:solidFill>
+                <a:latin typeface="+mn-lt"/>
+                <a:ea typeface="+mn-ea"/>
+                <a:cs typeface="+mn-cs"/>
+              </a:defRPr>
+            </a:lvl8pPr>
+            <a:lvl9pPr marL="4353115" algn="l" defTabSz="1088279" rtl="0" eaLnBrk="1" latinLnBrk="0" hangingPunct="1">
+              <a:defRPr sz="2143" kern="1200">
+                <a:solidFill>
+                  <a:schemeClr val="tx1"/>
+                </a:solidFill>
+                <a:latin typeface="+mn-lt"/>
+                <a:ea typeface="+mn-ea"/>
+                <a:cs typeface="+mn-cs"/>
+              </a:defRPr>
+            </a:lvl9pPr>
+          </a:lstStyle>
+          <a:p>
+            <a:pPr algn="ctr"/>
+            <a:r>
+              <a:rPr lang="en-AU" dirty="0">
+                <a:solidFill>
+                  <a:schemeClr val="bg1"/>
+                </a:solidFill>
+              </a:rPr>
+              <a:t>Materials: </a:t>
+            </a:r>
+            <a:r>
+              <a:rPr lang="en-AU" dirty="0">
+                <a:solidFill>
+                  <a:schemeClr val="bg1"/>
+                </a:solidFill>
+                <a:hlinkClick r:id="rId5">
+                  <a:extLst>
+                    <a:ext uri="{A12FA001-AC4F-418D-AE19-62706E023703}">
+                      <ahyp:hlinkClr xmlns:ahyp="http://schemas.microsoft.com/office/drawing/2018/hyperlinkcolor" val="tx"/>
+                    </a:ext>
+                  </a:extLst>
+                </a:hlinkClick>
+              </a:rPr>
+              <a:t>www.dartgo.org/sc-python</a:t>
+            </a:r>
+            <a:endParaRPr lang="en-AU" dirty="0">
+              <a:solidFill>
+                <a:schemeClr val="bg1"/>
+              </a:solidFill>
+            </a:endParaRPr>
+          </a:p>
+        </p:txBody>
+      </p:sp>
     </p:spTree>
     <p:extLst>
       <p:ext uri="{BB962C8B-B14F-4D97-AF65-F5344CB8AC3E}">
@@ -10195,6 +10348,142 @@
               <a:pPr/>
               <a:t>‹#›</a:t>
             </a:fld>
+            <a:endParaRPr lang="en-AU" dirty="0"/>
+          </a:p>
+        </p:txBody>
+      </p:sp>
+      <p:sp>
+        <p:nvSpPr>
+          <p:cNvPr id="4" name="Footer Placeholder 4">
+            <a:extLst>
+              <a:ext uri="{FF2B5EF4-FFF2-40B4-BE49-F238E27FC236}">
+                <a16:creationId xmlns:a16="http://schemas.microsoft.com/office/drawing/2014/main" id="{3BC119F4-5F19-9ED3-3380-D57931CDBC02}"/>
+              </a:ext>
+            </a:extLst>
+          </p:cNvPr>
+          <p:cNvSpPr txBox="1">
+            <a:spLocks/>
+          </p:cNvSpPr>
+          <p:nvPr userDrawn="1"/>
+        </p:nvSpPr>
+        <p:spPr>
+          <a:xfrm>
+            <a:off x="2383047" y="6565176"/>
+            <a:ext cx="7425906" cy="217125"/>
+          </a:xfrm>
+          <a:prstGeom prst="rect">
+            <a:avLst/>
+          </a:prstGeom>
+        </p:spPr>
+        <p:txBody>
+          <a:bodyPr vert="horz" lIns="0" tIns="0" rIns="0" bIns="0" rtlCol="0" anchor="ctr"/>
+          <a:lstStyle>
+            <a:defPPr>
+              <a:defRPr lang="en-US"/>
+            </a:defPPr>
+            <a:lvl1pPr marL="0" algn="l" defTabSz="1088279" rtl="0" eaLnBrk="1" latinLnBrk="0" hangingPunct="1">
+              <a:defRPr sz="1100" b="0" i="0" kern="1200">
+                <a:solidFill>
+                  <a:schemeClr val="accent1"/>
+                </a:solidFill>
+                <a:latin typeface="National 2" charset="0"/>
+                <a:ea typeface="National 2" charset="0"/>
+                <a:cs typeface="National 2" charset="0"/>
+              </a:defRPr>
+            </a:lvl1pPr>
+            <a:lvl2pPr marL="544139" algn="l" defTabSz="1088279" rtl="0" eaLnBrk="1" latinLnBrk="0" hangingPunct="1">
+              <a:defRPr sz="2143" kern="1200">
+                <a:solidFill>
+                  <a:schemeClr val="tx1"/>
+                </a:solidFill>
+                <a:latin typeface="+mn-lt"/>
+                <a:ea typeface="+mn-ea"/>
+                <a:cs typeface="+mn-cs"/>
+              </a:defRPr>
+            </a:lvl2pPr>
+            <a:lvl3pPr marL="1088279" algn="l" defTabSz="1088279" rtl="0" eaLnBrk="1" latinLnBrk="0" hangingPunct="1">
+              <a:defRPr sz="2143" kern="1200">
+                <a:solidFill>
+                  <a:schemeClr val="tx1"/>
+                </a:solidFill>
+                <a:latin typeface="+mn-lt"/>
+                <a:ea typeface="+mn-ea"/>
+                <a:cs typeface="+mn-cs"/>
+              </a:defRPr>
+            </a:lvl3pPr>
+            <a:lvl4pPr marL="1632418" algn="l" defTabSz="1088279" rtl="0" eaLnBrk="1" latinLnBrk="0" hangingPunct="1">
+              <a:defRPr sz="2143" kern="1200">
+                <a:solidFill>
+                  <a:schemeClr val="tx1"/>
+                </a:solidFill>
+                <a:latin typeface="+mn-lt"/>
+                <a:ea typeface="+mn-ea"/>
+                <a:cs typeface="+mn-cs"/>
+              </a:defRPr>
+            </a:lvl4pPr>
+            <a:lvl5pPr marL="2176558" algn="l" defTabSz="1088279" rtl="0" eaLnBrk="1" latinLnBrk="0" hangingPunct="1">
+              <a:defRPr sz="2143" kern="1200">
+                <a:solidFill>
+                  <a:schemeClr val="tx1"/>
+                </a:solidFill>
+                <a:latin typeface="+mn-lt"/>
+                <a:ea typeface="+mn-ea"/>
+                <a:cs typeface="+mn-cs"/>
+              </a:defRPr>
+            </a:lvl5pPr>
+            <a:lvl6pPr marL="2720696" algn="l" defTabSz="1088279" rtl="0" eaLnBrk="1" latinLnBrk="0" hangingPunct="1">
+              <a:defRPr sz="2143" kern="1200">
+                <a:solidFill>
+                  <a:schemeClr val="tx1"/>
+                </a:solidFill>
+                <a:latin typeface="+mn-lt"/>
+                <a:ea typeface="+mn-ea"/>
+                <a:cs typeface="+mn-cs"/>
+              </a:defRPr>
+            </a:lvl6pPr>
+            <a:lvl7pPr marL="3264836" algn="l" defTabSz="1088279" rtl="0" eaLnBrk="1" latinLnBrk="0" hangingPunct="1">
+              <a:defRPr sz="2143" kern="1200">
+                <a:solidFill>
+                  <a:schemeClr val="tx1"/>
+                </a:solidFill>
+                <a:latin typeface="+mn-lt"/>
+                <a:ea typeface="+mn-ea"/>
+                <a:cs typeface="+mn-cs"/>
+              </a:defRPr>
+            </a:lvl7pPr>
+            <a:lvl8pPr marL="3808976" algn="l" defTabSz="1088279" rtl="0" eaLnBrk="1" latinLnBrk="0" hangingPunct="1">
+              <a:defRPr sz="2143" kern="1200">
+                <a:solidFill>
+                  <a:schemeClr val="tx1"/>
+                </a:solidFill>
+                <a:latin typeface="+mn-lt"/>
+                <a:ea typeface="+mn-ea"/>
+                <a:cs typeface="+mn-cs"/>
+              </a:defRPr>
+            </a:lvl8pPr>
+            <a:lvl9pPr marL="4353115" algn="l" defTabSz="1088279" rtl="0" eaLnBrk="1" latinLnBrk="0" hangingPunct="1">
+              <a:defRPr sz="2143" kern="1200">
+                <a:solidFill>
+                  <a:schemeClr val="tx1"/>
+                </a:solidFill>
+                <a:latin typeface="+mn-lt"/>
+                <a:ea typeface="+mn-ea"/>
+                <a:cs typeface="+mn-cs"/>
+              </a:defRPr>
+            </a:lvl9pPr>
+          </a:lstStyle>
+          <a:p>
+            <a:pPr algn="ctr"/>
+            <a:r>
+              <a:rPr lang="en-AU" dirty="0"/>
+              <a:t>Materials: </a:t>
+            </a:r>
+            <a:r>
+              <a:rPr lang="en-AU" dirty="0">
+                <a:hlinkClick r:id="rId30"/>
+              </a:rPr>
+              <a:t>www.dartgo.org/sc-python</a:t>
+            </a:r>
             <a:endParaRPr lang="en-AU" dirty="0"/>
           </a:p>
         </p:txBody>

</xml_diff>